<commit_message>
Petit Update de mi-Parcours PPT
</commit_message>
<xml_diff>
--- a/Présentation1.pptx
+++ b/Présentation1.pptx
@@ -5,7 +5,7 @@
     <p:sldMasterId id="2147483840" r:id="rId1"/>
   </p:sldMasterIdLst>
   <p:notesMasterIdLst>
-    <p:notesMasterId r:id="rId13"/>
+    <p:notesMasterId r:id="rId21"/>
   </p:notesMasterIdLst>
   <p:sldIdLst>
     <p:sldId id="256" r:id="rId2"/>
@@ -19,6 +19,14 @@
     <p:sldId id="265" r:id="rId10"/>
     <p:sldId id="266" r:id="rId11"/>
     <p:sldId id="268" r:id="rId12"/>
+    <p:sldId id="269" r:id="rId13"/>
+    <p:sldId id="270" r:id="rId14"/>
+    <p:sldId id="271" r:id="rId15"/>
+    <p:sldId id="273" r:id="rId16"/>
+    <p:sldId id="272" r:id="rId17"/>
+    <p:sldId id="274" r:id="rId18"/>
+    <p:sldId id="275" r:id="rId19"/>
+    <p:sldId id="276" r:id="rId20"/>
   </p:sldIdLst>
   <p:sldSz cx="12192000" cy="6858000"/>
   <p:notesSz cx="6858000" cy="9144000"/>
@@ -145,9 +153,24 @@
           <p14:sldIdLst>
             <p14:sldId id="266"/>
             <p14:sldId id="268"/>
+            <p14:sldId id="269"/>
+            <p14:sldId id="270"/>
+            <p14:sldId id="271"/>
+            <p14:sldId id="273"/>
+            <p14:sldId id="272"/>
+            <p14:sldId id="274"/>
+          </p14:sldIdLst>
+        </p14:section>
+        <p14:section name="Perspectives pour la suite" id="{66964EE5-A75D-BF42-B63B-FD258108FEAD}">
+          <p14:sldIdLst>
+            <p14:sldId id="275"/>
+            <p14:sldId id="276"/>
           </p14:sldIdLst>
         </p14:section>
       </p14:sectionLst>
+    </p:ext>
+    <p:ext uri="{EFAFB233-063F-42B5-8137-9DF3F51BA10A}">
+      <p15:sldGuideLst xmlns:p15="http://schemas.microsoft.com/office/powerpoint/2012/main"/>
     </p:ext>
   </p:extLst>
 </p:presentation>
@@ -235,7 +258,7 @@
           <a:p>
             <a:fld id="{EB14B83D-97C1-5F44-84C9-3CE56D0AA4F2}" type="datetimeFigureOut">
               <a:rPr lang="fr-FR" smtClean="0"/>
-              <a:t>06/03/2018</a:t>
+              <a:t>07/03/2018</a:t>
             </a:fld>
             <a:endParaRPr lang="fr-FR"/>
           </a:p>
@@ -728,7 +751,7 @@
             <a:fld id="{5586B75A-687E-405C-8A0B-8D00578BA2C3}" type="datetimeFigureOut">
               <a:rPr lang="en-US" dirty="0"/>
               <a:pPr/>
-              <a:t>3/6/18</a:t>
+              <a:t>3/7/18</a:t>
             </a:fld>
             <a:endParaRPr lang="en-US" dirty="0"/>
           </a:p>
@@ -998,7 +1021,7 @@
             <a:fld id="{5586B75A-687E-405C-8A0B-8D00578BA2C3}" type="datetimeFigureOut">
               <a:rPr lang="en-US" dirty="0"/>
               <a:pPr/>
-              <a:t>3/6/18</a:t>
+              <a:t>3/7/18</a:t>
             </a:fld>
             <a:endParaRPr lang="en-US" dirty="0"/>
           </a:p>
@@ -1170,7 +1193,7 @@
             <a:fld id="{5586B75A-687E-405C-8A0B-8D00578BA2C3}" type="datetimeFigureOut">
               <a:rPr lang="en-US" dirty="0"/>
               <a:pPr/>
-              <a:t>3/6/18</a:t>
+              <a:t>3/7/18</a:t>
             </a:fld>
             <a:endParaRPr lang="en-US" dirty="0"/>
           </a:p>
@@ -1347,7 +1370,7 @@
             <a:fld id="{5586B75A-687E-405C-8A0B-8D00578BA2C3}" type="datetimeFigureOut">
               <a:rPr lang="en-US" dirty="0"/>
               <a:pPr/>
-              <a:t>3/6/18</a:t>
+              <a:t>3/7/18</a:t>
             </a:fld>
             <a:endParaRPr lang="en-US" dirty="0"/>
           </a:p>
@@ -1514,7 +1537,7 @@
             <a:fld id="{5586B75A-687E-405C-8A0B-8D00578BA2C3}" type="datetimeFigureOut">
               <a:rPr lang="en-US" dirty="0"/>
               <a:pPr/>
-              <a:t>3/6/18</a:t>
+              <a:t>3/7/18</a:t>
             </a:fld>
             <a:endParaRPr lang="en-US" dirty="0"/>
           </a:p>
@@ -1769,7 +1792,7 @@
             <a:fld id="{5586B75A-687E-405C-8A0B-8D00578BA2C3}" type="datetimeFigureOut">
               <a:rPr lang="en-US" dirty="0"/>
               <a:pPr/>
-              <a:t>3/6/18</a:t>
+              <a:t>3/7/18</a:t>
             </a:fld>
             <a:endParaRPr lang="en-US" dirty="0"/>
           </a:p>
@@ -2054,7 +2077,7 @@
             <a:fld id="{5586B75A-687E-405C-8A0B-8D00578BA2C3}" type="datetimeFigureOut">
               <a:rPr lang="en-US" dirty="0"/>
               <a:pPr/>
-              <a:t>3/6/18</a:t>
+              <a:t>3/7/18</a:t>
             </a:fld>
             <a:endParaRPr lang="en-US" dirty="0"/>
           </a:p>
@@ -2493,7 +2516,7 @@
             <a:fld id="{5586B75A-687E-405C-8A0B-8D00578BA2C3}" type="datetimeFigureOut">
               <a:rPr lang="en-US" dirty="0"/>
               <a:pPr/>
-              <a:t>3/6/18</a:t>
+              <a:t>3/7/18</a:t>
             </a:fld>
             <a:endParaRPr lang="en-US" dirty="0"/>
           </a:p>
@@ -2608,7 +2631,7 @@
             <a:fld id="{5586B75A-687E-405C-8A0B-8D00578BA2C3}" type="datetimeFigureOut">
               <a:rPr lang="en-US" dirty="0"/>
               <a:pPr/>
-              <a:t>3/6/18</a:t>
+              <a:t>3/7/18</a:t>
             </a:fld>
             <a:endParaRPr lang="en-US" dirty="0"/>
           </a:p>
@@ -2700,7 +2723,7 @@
             <a:fld id="{5586B75A-687E-405C-8A0B-8D00578BA2C3}" type="datetimeFigureOut">
               <a:rPr lang="en-US" dirty="0"/>
               <a:pPr/>
-              <a:t>3/6/18</a:t>
+              <a:t>3/7/18</a:t>
             </a:fld>
             <a:endParaRPr lang="en-US" dirty="0"/>
           </a:p>
@@ -2845,7 +2868,7 @@
             <a:fld id="{5586B75A-687E-405C-8A0B-8D00578BA2C3}" type="datetimeFigureOut">
               <a:rPr lang="en-US" smtClean="0"/>
               <a:pPr/>
-              <a:t>3/6/18</a:t>
+              <a:t>3/7/18</a:t>
             </a:fld>
             <a:endParaRPr lang="en-US" dirty="0"/>
           </a:p>
@@ -3135,7 +3158,7 @@
             <a:fld id="{5586B75A-687E-405C-8A0B-8D00578BA2C3}" type="datetimeFigureOut">
               <a:rPr lang="en-US" dirty="0"/>
               <a:pPr/>
-              <a:t>3/6/18</a:t>
+              <a:t>3/7/18</a:t>
             </a:fld>
             <a:endParaRPr lang="en-US" dirty="0"/>
           </a:p>
@@ -3424,7 +3447,7 @@
             <a:fld id="{5586B75A-687E-405C-8A0B-8D00578BA2C3}" type="datetimeFigureOut">
               <a:rPr lang="en-US" dirty="0"/>
               <a:pPr/>
-              <a:t>3/6/18</a:t>
+              <a:t>3/7/18</a:t>
             </a:fld>
             <a:endParaRPr lang="en-US" dirty="0"/>
           </a:p>
@@ -4085,66 +4108,6 @@
           </a:p>
         </p:txBody>
       </p:sp>
-      <p:pic>
-        <p:nvPicPr>
-          <p:cNvPr id="3" name="Image 2"/>
-          <p:cNvPicPr>
-            <a:picLocks noChangeAspect="1"/>
-          </p:cNvPicPr>
-          <p:nvPr/>
-        </p:nvPicPr>
-        <p:blipFill>
-          <a:blip r:embed="rId2">
-            <a:extLst>
-              <a:ext uri="{28A0092B-C50C-407E-A947-70E740481C1C}">
-                <a14:useLocalDpi xmlns:a14="http://schemas.microsoft.com/office/drawing/2010/main" val="0"/>
-              </a:ext>
-            </a:extLst>
-          </a:blip>
-          <a:stretch>
-            <a:fillRect/>
-          </a:stretch>
-        </p:blipFill>
-        <p:spPr>
-          <a:xfrm>
-            <a:off x="3536889" y="1706880"/>
-            <a:ext cx="7421361" cy="4282299"/>
-          </a:xfrm>
-          <a:prstGeom prst="rect">
-            <a:avLst/>
-          </a:prstGeom>
-        </p:spPr>
-      </p:pic>
-      <p:pic>
-        <p:nvPicPr>
-          <p:cNvPr id="4" name="Image 3"/>
-          <p:cNvPicPr>
-            <a:picLocks noChangeAspect="1"/>
-          </p:cNvPicPr>
-          <p:nvPr/>
-        </p:nvPicPr>
-        <p:blipFill>
-          <a:blip r:embed="rId2">
-            <a:extLst>
-              <a:ext uri="{28A0092B-C50C-407E-A947-70E740481C1C}">
-                <a14:useLocalDpi xmlns:a14="http://schemas.microsoft.com/office/drawing/2010/main" val="0"/>
-              </a:ext>
-            </a:extLst>
-          </a:blip>
-          <a:stretch>
-            <a:fillRect/>
-          </a:stretch>
-        </p:blipFill>
-        <p:spPr>
-          <a:xfrm>
-            <a:off x="3699449" y="1706880"/>
-            <a:ext cx="7421361" cy="4282299"/>
-          </a:xfrm>
-          <a:prstGeom prst="rect">
-            <a:avLst/>
-          </a:prstGeom>
-        </p:spPr>
-      </p:pic>
     </p:spTree>
     <p:extLst>
       <p:ext uri="{BB962C8B-B14F-4D97-AF65-F5344CB8AC3E}">
@@ -4248,6 +4211,2047 @@
     <p:extLst>
       <p:ext uri="{BB962C8B-B14F-4D97-AF65-F5344CB8AC3E}">
         <p14:creationId xmlns:p14="http://schemas.microsoft.com/office/powerpoint/2010/main" val="797615174"/>
+      </p:ext>
+    </p:extLst>
+  </p:cSld>
+  <p:clrMapOvr>
+    <a:masterClrMapping/>
+  </p:clrMapOvr>
+</p:sld>
+</file>
+
+<file path=ppt/slides/slide12.xml><?xml version="1.0" encoding="utf-8"?>
+<p:sld xmlns:a="http://schemas.openxmlformats.org/drawingml/2006/main" xmlns:r="http://schemas.openxmlformats.org/officeDocument/2006/relationships" xmlns:p="http://schemas.openxmlformats.org/presentationml/2006/main">
+  <p:cSld>
+    <p:spTree>
+      <p:nvGrpSpPr>
+        <p:cNvPr id="1" name=""/>
+        <p:cNvGrpSpPr/>
+        <p:nvPr/>
+      </p:nvGrpSpPr>
+      <p:grpSpPr>
+        <a:xfrm>
+          <a:off x="0" y="0"/>
+          <a:ext cx="0" cy="0"/>
+          <a:chOff x="0" y="0"/>
+          <a:chExt cx="0" cy="0"/>
+        </a:xfrm>
+      </p:grpSpPr>
+      <p:sp>
+        <p:nvSpPr>
+          <p:cNvPr id="7" name="Forme libre 6"/>
+          <p:cNvSpPr/>
+          <p:nvPr/>
+        </p:nvSpPr>
+        <p:spPr>
+          <a:xfrm>
+            <a:off x="3798835" y="2628000"/>
+            <a:ext cx="4245428" cy="3682800"/>
+          </a:xfrm>
+          <a:custGeom>
+            <a:avLst/>
+            <a:gdLst>
+              <a:gd name="connsiteX0" fmla="*/ 0 w 4245428"/>
+              <a:gd name="connsiteY0" fmla="*/ 809897 h 3683725"/>
+              <a:gd name="connsiteX1" fmla="*/ 0 w 4245428"/>
+              <a:gd name="connsiteY1" fmla="*/ 3056708 h 3683725"/>
+              <a:gd name="connsiteX2" fmla="*/ 2377440 w 4245428"/>
+              <a:gd name="connsiteY2" fmla="*/ 3683725 h 3683725"/>
+              <a:gd name="connsiteX3" fmla="*/ 4245428 w 4245428"/>
+              <a:gd name="connsiteY3" fmla="*/ 2377440 h 3683725"/>
+              <a:gd name="connsiteX4" fmla="*/ 2338251 w 4245428"/>
+              <a:gd name="connsiteY4" fmla="*/ 0 h 3683725"/>
+              <a:gd name="connsiteX5" fmla="*/ 0 w 4245428"/>
+              <a:gd name="connsiteY5" fmla="*/ 809897 h 3683725"/>
+            </a:gdLst>
+            <a:ahLst/>
+            <a:cxnLst>
+              <a:cxn ang="0">
+                <a:pos x="connsiteX0" y="connsiteY0"/>
+              </a:cxn>
+              <a:cxn ang="0">
+                <a:pos x="connsiteX1" y="connsiteY1"/>
+              </a:cxn>
+              <a:cxn ang="0">
+                <a:pos x="connsiteX2" y="connsiteY2"/>
+              </a:cxn>
+              <a:cxn ang="0">
+                <a:pos x="connsiteX3" y="connsiteY3"/>
+              </a:cxn>
+              <a:cxn ang="0">
+                <a:pos x="connsiteX4" y="connsiteY4"/>
+              </a:cxn>
+              <a:cxn ang="0">
+                <a:pos x="connsiteX5" y="connsiteY5"/>
+              </a:cxn>
+            </a:cxnLst>
+            <a:rect l="l" t="t" r="r" b="b"/>
+            <a:pathLst>
+              <a:path w="4245428" h="3683725">
+                <a:moveTo>
+                  <a:pt x="0" y="809897"/>
+                </a:moveTo>
+                <a:lnTo>
+                  <a:pt x="0" y="3056708"/>
+                </a:lnTo>
+                <a:lnTo>
+                  <a:pt x="2377440" y="3683725"/>
+                </a:lnTo>
+                <a:lnTo>
+                  <a:pt x="4245428" y="2377440"/>
+                </a:lnTo>
+                <a:lnTo>
+                  <a:pt x="2338251" y="0"/>
+                </a:lnTo>
+                <a:lnTo>
+                  <a:pt x="0" y="809897"/>
+                </a:lnTo>
+                <a:close/>
+              </a:path>
+            </a:pathLst>
+          </a:custGeom>
+        </p:spPr>
+        <p:style>
+          <a:lnRef idx="2">
+            <a:schemeClr val="accent1">
+              <a:shade val="50000"/>
+            </a:schemeClr>
+          </a:lnRef>
+          <a:fillRef idx="1">
+            <a:schemeClr val="accent1"/>
+          </a:fillRef>
+          <a:effectRef idx="0">
+            <a:schemeClr val="accent1"/>
+          </a:effectRef>
+          <a:fontRef idx="minor">
+            <a:schemeClr val="lt1"/>
+          </a:fontRef>
+        </p:style>
+        <p:txBody>
+          <a:bodyPr rtlCol="0" anchor="ctr"/>
+          <a:lstStyle/>
+          <a:p>
+            <a:pPr algn="ctr"/>
+            <a:endParaRPr lang="fr-FR"/>
+          </a:p>
+        </p:txBody>
+      </p:sp>
+      <p:sp>
+        <p:nvSpPr>
+          <p:cNvPr id="2" name="ZoneTexte 1"/>
+          <p:cNvSpPr txBox="1"/>
+          <p:nvPr/>
+        </p:nvSpPr>
+        <p:spPr>
+          <a:xfrm>
+            <a:off x="393014" y="303939"/>
+            <a:ext cx="11057069" cy="584775"/>
+          </a:xfrm>
+          <a:prstGeom prst="rect">
+            <a:avLst/>
+          </a:prstGeom>
+          <a:noFill/>
+        </p:spPr>
+        <p:txBody>
+          <a:bodyPr wrap="square" rtlCol="0">
+            <a:spAutoFit/>
+          </a:bodyPr>
+          <a:lstStyle/>
+          <a:p>
+            <a:pPr algn="ctr"/>
+            <a:r>
+              <a:rPr lang="fr-FR" sz="3200" dirty="0" smtClean="0">
+                <a:latin typeface="Futura Condensed" charset="0"/>
+                <a:ea typeface="Futura Condensed" charset="0"/>
+                <a:cs typeface="Futura Condensed" charset="0"/>
+              </a:rPr>
+              <a:t>Déplacement d’un point selon l’algorithme</a:t>
+            </a:r>
+          </a:p>
+        </p:txBody>
+      </p:sp>
+      <p:cxnSp>
+        <p:nvCxnSpPr>
+          <p:cNvPr id="9" name="Connecteur droit 8"/>
+          <p:cNvCxnSpPr/>
+          <p:nvPr/>
+        </p:nvCxnSpPr>
+        <p:spPr>
+          <a:xfrm>
+            <a:off x="2691161" y="3025698"/>
+            <a:ext cx="6579219" cy="2438400"/>
+          </a:xfrm>
+          <a:prstGeom prst="line">
+            <a:avLst/>
+          </a:prstGeom>
+          <a:ln w="31750">
+            <a:solidFill>
+              <a:schemeClr val="accent6"/>
+            </a:solidFill>
+          </a:ln>
+        </p:spPr>
+        <p:style>
+          <a:lnRef idx="1">
+            <a:schemeClr val="accent1"/>
+          </a:lnRef>
+          <a:fillRef idx="0">
+            <a:schemeClr val="accent1"/>
+          </a:fillRef>
+          <a:effectRef idx="0">
+            <a:schemeClr val="accent1"/>
+          </a:effectRef>
+          <a:fontRef idx="minor">
+            <a:schemeClr val="tx1"/>
+          </a:fontRef>
+        </p:style>
+      </p:cxnSp>
+      <p:cxnSp>
+        <p:nvCxnSpPr>
+          <p:cNvPr id="18" name="Connecteur droit 17"/>
+          <p:cNvCxnSpPr/>
+          <p:nvPr/>
+        </p:nvCxnSpPr>
+        <p:spPr>
+          <a:xfrm>
+            <a:off x="3149058" y="1519088"/>
+            <a:ext cx="6579219" cy="2438400"/>
+          </a:xfrm>
+          <a:prstGeom prst="line">
+            <a:avLst/>
+          </a:prstGeom>
+          <a:ln w="31750">
+            <a:solidFill>
+              <a:schemeClr val="accent6"/>
+            </a:solidFill>
+          </a:ln>
+        </p:spPr>
+        <p:style>
+          <a:lnRef idx="1">
+            <a:schemeClr val="accent1"/>
+          </a:lnRef>
+          <a:fillRef idx="0">
+            <a:schemeClr val="accent1"/>
+          </a:fillRef>
+          <a:effectRef idx="0">
+            <a:schemeClr val="accent1"/>
+          </a:effectRef>
+          <a:fontRef idx="minor">
+            <a:schemeClr val="tx1"/>
+          </a:fontRef>
+        </p:style>
+      </p:cxnSp>
+      <p:sp>
+        <p:nvSpPr>
+          <p:cNvPr id="16" name="Ellipse 15"/>
+          <p:cNvSpPr/>
+          <p:nvPr/>
+        </p:nvSpPr>
+        <p:spPr>
+          <a:xfrm>
+            <a:off x="6089059" y="2588050"/>
+            <a:ext cx="91556" cy="79899"/>
+          </a:xfrm>
+          <a:prstGeom prst="ellipse">
+            <a:avLst/>
+          </a:prstGeom>
+        </p:spPr>
+        <p:style>
+          <a:lnRef idx="2">
+            <a:schemeClr val="dk1">
+              <a:shade val="50000"/>
+            </a:schemeClr>
+          </a:lnRef>
+          <a:fillRef idx="1">
+            <a:schemeClr val="dk1"/>
+          </a:fillRef>
+          <a:effectRef idx="0">
+            <a:schemeClr val="dk1"/>
+          </a:effectRef>
+          <a:fontRef idx="minor">
+            <a:schemeClr val="lt1"/>
+          </a:fontRef>
+        </p:style>
+        <p:txBody>
+          <a:bodyPr rtlCol="0" anchor="ctr"/>
+          <a:lstStyle/>
+          <a:p>
+            <a:pPr algn="ctr"/>
+            <a:endParaRPr lang="fr-FR"/>
+          </a:p>
+        </p:txBody>
+      </p:sp>
+      <p:cxnSp>
+        <p:nvCxnSpPr>
+          <p:cNvPr id="20" name="Connecteur droit 19"/>
+          <p:cNvCxnSpPr/>
+          <p:nvPr/>
+        </p:nvCxnSpPr>
+        <p:spPr>
+          <a:xfrm flipH="1">
+            <a:off x="5459568" y="2330174"/>
+            <a:ext cx="64293" cy="171450"/>
+          </a:xfrm>
+          <a:prstGeom prst="line">
+            <a:avLst/>
+          </a:prstGeom>
+          <a:ln w="38100">
+            <a:solidFill>
+              <a:srgbClr val="C00000"/>
+            </a:solidFill>
+          </a:ln>
+        </p:spPr>
+        <p:style>
+          <a:lnRef idx="1">
+            <a:schemeClr val="accent1"/>
+          </a:lnRef>
+          <a:fillRef idx="0">
+            <a:schemeClr val="accent1"/>
+          </a:fillRef>
+          <a:effectRef idx="0">
+            <a:schemeClr val="accent1"/>
+          </a:effectRef>
+          <a:fontRef idx="minor">
+            <a:schemeClr val="tx1"/>
+          </a:fontRef>
+        </p:style>
+      </p:cxnSp>
+      <p:cxnSp>
+        <p:nvCxnSpPr>
+          <p:cNvPr id="21" name="Connecteur droit 20"/>
+          <p:cNvCxnSpPr/>
+          <p:nvPr/>
+        </p:nvCxnSpPr>
+        <p:spPr>
+          <a:xfrm flipH="1">
+            <a:off x="7475677" y="3025698"/>
+            <a:ext cx="64293" cy="171450"/>
+          </a:xfrm>
+          <a:prstGeom prst="line">
+            <a:avLst/>
+          </a:prstGeom>
+          <a:ln w="38100">
+            <a:solidFill>
+              <a:srgbClr val="C00000"/>
+            </a:solidFill>
+          </a:ln>
+        </p:spPr>
+        <p:style>
+          <a:lnRef idx="1">
+            <a:schemeClr val="accent1"/>
+          </a:lnRef>
+          <a:fillRef idx="0">
+            <a:schemeClr val="accent1"/>
+          </a:fillRef>
+          <a:effectRef idx="0">
+            <a:schemeClr val="accent1"/>
+          </a:effectRef>
+          <a:fontRef idx="minor">
+            <a:schemeClr val="tx1"/>
+          </a:fontRef>
+        </p:style>
+      </p:cxnSp>
+      <p:cxnSp>
+        <p:nvCxnSpPr>
+          <p:cNvPr id="22" name="Connecteur droit 21"/>
+          <p:cNvCxnSpPr/>
+          <p:nvPr/>
+        </p:nvCxnSpPr>
+        <p:spPr>
+          <a:xfrm flipH="1">
+            <a:off x="4853489" y="2093271"/>
+            <a:ext cx="64293" cy="171450"/>
+          </a:xfrm>
+          <a:prstGeom prst="line">
+            <a:avLst/>
+          </a:prstGeom>
+          <a:ln w="38100">
+            <a:solidFill>
+              <a:srgbClr val="C00000"/>
+            </a:solidFill>
+          </a:ln>
+        </p:spPr>
+        <p:style>
+          <a:lnRef idx="1">
+            <a:schemeClr val="accent1"/>
+          </a:lnRef>
+          <a:fillRef idx="0">
+            <a:schemeClr val="accent1"/>
+          </a:fillRef>
+          <a:effectRef idx="0">
+            <a:schemeClr val="accent1"/>
+          </a:effectRef>
+          <a:fontRef idx="minor">
+            <a:schemeClr val="tx1"/>
+          </a:fontRef>
+        </p:style>
+      </p:cxnSp>
+      <p:cxnSp>
+        <p:nvCxnSpPr>
+          <p:cNvPr id="23" name="Connecteur droit 22"/>
+          <p:cNvCxnSpPr/>
+          <p:nvPr/>
+        </p:nvCxnSpPr>
+        <p:spPr>
+          <a:xfrm flipH="1">
+            <a:off x="6753432" y="2772946"/>
+            <a:ext cx="64293" cy="171450"/>
+          </a:xfrm>
+          <a:prstGeom prst="line">
+            <a:avLst/>
+          </a:prstGeom>
+          <a:ln w="38100">
+            <a:solidFill>
+              <a:srgbClr val="C00000"/>
+            </a:solidFill>
+          </a:ln>
+        </p:spPr>
+        <p:style>
+          <a:lnRef idx="1">
+            <a:schemeClr val="accent1"/>
+          </a:lnRef>
+          <a:fillRef idx="0">
+            <a:schemeClr val="accent1"/>
+          </a:fillRef>
+          <a:effectRef idx="0">
+            <a:schemeClr val="accent1"/>
+          </a:effectRef>
+          <a:fontRef idx="minor">
+            <a:schemeClr val="tx1"/>
+          </a:fontRef>
+        </p:style>
+      </p:cxnSp>
+      <p:cxnSp>
+        <p:nvCxnSpPr>
+          <p:cNvPr id="25" name="Connecteur droit avec flèche 24"/>
+          <p:cNvCxnSpPr/>
+          <p:nvPr/>
+        </p:nvCxnSpPr>
+        <p:spPr>
+          <a:xfrm flipH="1">
+            <a:off x="6949440" y="2264720"/>
+            <a:ext cx="875211" cy="504000"/>
+          </a:xfrm>
+          <a:prstGeom prst="straightConnector1">
+            <a:avLst/>
+          </a:prstGeom>
+          <a:ln>
+            <a:tailEnd type="triangle"/>
+          </a:ln>
+        </p:spPr>
+        <p:style>
+          <a:lnRef idx="2">
+            <a:schemeClr val="accent6"/>
+          </a:lnRef>
+          <a:fillRef idx="0">
+            <a:schemeClr val="accent6"/>
+          </a:fillRef>
+          <a:effectRef idx="1">
+            <a:schemeClr val="accent6"/>
+          </a:effectRef>
+          <a:fontRef idx="minor">
+            <a:schemeClr val="tx1"/>
+          </a:fontRef>
+        </p:style>
+      </p:cxnSp>
+      <p:sp>
+        <p:nvSpPr>
+          <p:cNvPr id="26" name="ZoneTexte 25"/>
+          <p:cNvSpPr txBox="1"/>
+          <p:nvPr/>
+        </p:nvSpPr>
+        <p:spPr>
+          <a:xfrm>
+            <a:off x="7029231" y="1622349"/>
+            <a:ext cx="3156943" cy="584775"/>
+          </a:xfrm>
+          <a:prstGeom prst="rect">
+            <a:avLst/>
+          </a:prstGeom>
+          <a:noFill/>
+        </p:spPr>
+        <p:txBody>
+          <a:bodyPr wrap="square" rtlCol="0">
+            <a:spAutoFit/>
+          </a:bodyPr>
+          <a:lstStyle/>
+          <a:p>
+            <a:pPr algn="ctr"/>
+            <a:r>
+              <a:rPr lang="fr-FR" sz="3200" smtClean="0">
+                <a:latin typeface="Futura Condensed" charset="0"/>
+                <a:ea typeface="Futura Condensed" charset="0"/>
+                <a:cs typeface="Futura Condensed" charset="0"/>
+              </a:rPr>
+              <a:t>Position possible</a:t>
+            </a:r>
+            <a:endParaRPr lang="fr-FR" sz="3200" dirty="0">
+              <a:latin typeface="Futura Condensed" charset="0"/>
+              <a:ea typeface="Futura Condensed" charset="0"/>
+              <a:cs typeface="Futura Condensed" charset="0"/>
+            </a:endParaRPr>
+          </a:p>
+        </p:txBody>
+      </p:sp>
+      <p:cxnSp>
+        <p:nvCxnSpPr>
+          <p:cNvPr id="30" name="Connecteur droit avec flèche 29"/>
+          <p:cNvCxnSpPr/>
+          <p:nvPr/>
+        </p:nvCxnSpPr>
+        <p:spPr>
+          <a:xfrm>
+            <a:off x="5576808" y="2177074"/>
+            <a:ext cx="603807" cy="229337"/>
+          </a:xfrm>
+          <a:prstGeom prst="straightConnector1">
+            <a:avLst/>
+          </a:prstGeom>
+          <a:ln>
+            <a:headEnd type="triangle"/>
+            <a:tailEnd type="triangle"/>
+          </a:ln>
+        </p:spPr>
+        <p:style>
+          <a:lnRef idx="1">
+            <a:schemeClr val="accent6"/>
+          </a:lnRef>
+          <a:fillRef idx="0">
+            <a:schemeClr val="accent6"/>
+          </a:fillRef>
+          <a:effectRef idx="0">
+            <a:schemeClr val="accent6"/>
+          </a:effectRef>
+          <a:fontRef idx="minor">
+            <a:schemeClr val="tx1"/>
+          </a:fontRef>
+        </p:style>
+      </p:cxnSp>
+      <p:sp>
+        <p:nvSpPr>
+          <p:cNvPr id="32" name="ZoneTexte 31"/>
+          <p:cNvSpPr txBox="1"/>
+          <p:nvPr/>
+        </p:nvSpPr>
+        <p:spPr>
+          <a:xfrm>
+            <a:off x="4402298" y="1836145"/>
+            <a:ext cx="3156943" cy="400110"/>
+          </a:xfrm>
+          <a:prstGeom prst="rect">
+            <a:avLst/>
+          </a:prstGeom>
+          <a:noFill/>
+        </p:spPr>
+        <p:txBody>
+          <a:bodyPr wrap="square" rtlCol="0">
+            <a:spAutoFit/>
+          </a:bodyPr>
+          <a:lstStyle/>
+          <a:p>
+            <a:pPr algn="ctr"/>
+            <a:r>
+              <a:rPr lang="fr-FR" sz="2000" dirty="0" smtClean="0">
+                <a:latin typeface="Futura Condensed" charset="0"/>
+                <a:ea typeface="Futura Condensed" charset="0"/>
+                <a:cs typeface="Futura Condensed" charset="0"/>
+              </a:rPr>
+              <a:t>Pas</a:t>
+            </a:r>
+            <a:endParaRPr lang="fr-FR" sz="2000" dirty="0">
+              <a:latin typeface="Futura Condensed" charset="0"/>
+              <a:ea typeface="Futura Condensed" charset="0"/>
+              <a:cs typeface="Futura Condensed" charset="0"/>
+            </a:endParaRPr>
+          </a:p>
+        </p:txBody>
+      </p:sp>
+    </p:spTree>
+    <p:extLst>
+      <p:ext uri="{BB962C8B-B14F-4D97-AF65-F5344CB8AC3E}">
+        <p14:creationId xmlns:p14="http://schemas.microsoft.com/office/powerpoint/2010/main" val="865826596"/>
+      </p:ext>
+    </p:extLst>
+  </p:cSld>
+  <p:clrMapOvr>
+    <a:masterClrMapping/>
+  </p:clrMapOvr>
+</p:sld>
+</file>
+
+<file path=ppt/slides/slide13.xml><?xml version="1.0" encoding="utf-8"?>
+<p:sld xmlns:a="http://schemas.openxmlformats.org/drawingml/2006/main" xmlns:r="http://schemas.openxmlformats.org/officeDocument/2006/relationships" xmlns:p="http://schemas.openxmlformats.org/presentationml/2006/main">
+  <p:cSld>
+    <p:spTree>
+      <p:nvGrpSpPr>
+        <p:cNvPr id="1" name=""/>
+        <p:cNvGrpSpPr/>
+        <p:nvPr/>
+      </p:nvGrpSpPr>
+      <p:grpSpPr>
+        <a:xfrm>
+          <a:off x="0" y="0"/>
+          <a:ext cx="0" cy="0"/>
+          <a:chOff x="0" y="0"/>
+          <a:chExt cx="0" cy="0"/>
+        </a:xfrm>
+      </p:grpSpPr>
+      <p:sp>
+        <p:nvSpPr>
+          <p:cNvPr id="10" name="ZoneTexte 9"/>
+          <p:cNvSpPr txBox="1"/>
+          <p:nvPr/>
+        </p:nvSpPr>
+        <p:spPr>
+          <a:xfrm>
+            <a:off x="840726" y="0"/>
+            <a:ext cx="11057069" cy="7355860"/>
+          </a:xfrm>
+          <a:prstGeom prst="rect">
+            <a:avLst/>
+          </a:prstGeom>
+          <a:noFill/>
+        </p:spPr>
+        <p:txBody>
+          <a:bodyPr wrap="square" rtlCol="0">
+            <a:spAutoFit/>
+          </a:bodyPr>
+          <a:lstStyle/>
+          <a:p>
+            <a:pPr algn="ctr"/>
+            <a:r>
+              <a:rPr lang="fr-FR" sz="4000" u="sng" dirty="0" smtClean="0">
+                <a:latin typeface="Futura Condensed" charset="0"/>
+                <a:ea typeface="Futura Condensed" charset="0"/>
+                <a:cs typeface="Futura Condensed" charset="0"/>
+              </a:rPr>
+              <a:t>Itération de l’Algorithme :</a:t>
+            </a:r>
+          </a:p>
+          <a:p>
+            <a:pPr algn="ctr"/>
+            <a:endParaRPr lang="fr-FR" sz="4000" u="sng" dirty="0">
+              <a:latin typeface="Futura Condensed" charset="0"/>
+              <a:ea typeface="Futura Condensed" charset="0"/>
+              <a:cs typeface="Futura Condensed" charset="0"/>
+            </a:endParaRPr>
+          </a:p>
+          <a:p>
+            <a:pPr marL="571500" indent="-571500">
+              <a:buFont typeface="Arial" charset="0"/>
+              <a:buChar char="•"/>
+            </a:pPr>
+            <a:r>
+              <a:rPr lang="fr-FR" sz="3600" b="1" dirty="0" smtClean="0">
+                <a:latin typeface="Futura Condensed" charset="0"/>
+                <a:ea typeface="Futura Condensed" charset="0"/>
+                <a:cs typeface="Futura Condensed" charset="0"/>
+              </a:rPr>
+              <a:t>On parcours les sommets du polygone</a:t>
+            </a:r>
+          </a:p>
+          <a:p>
+            <a:pPr marL="571500" indent="-571500">
+              <a:buFont typeface="Arial" charset="0"/>
+              <a:buChar char="•"/>
+            </a:pPr>
+            <a:endParaRPr lang="fr-FR" sz="3600" dirty="0" smtClean="0">
+              <a:latin typeface="Futura Condensed" charset="0"/>
+              <a:ea typeface="Futura Condensed" charset="0"/>
+              <a:cs typeface="Futura Condensed" charset="0"/>
+            </a:endParaRPr>
+          </a:p>
+          <a:p>
+            <a:pPr marL="1028700" lvl="1" indent="-571500">
+              <a:buFont typeface="Arial" charset="0"/>
+              <a:buChar char="•"/>
+            </a:pPr>
+            <a:r>
+              <a:rPr lang="fr-FR" sz="3600" dirty="0" smtClean="0">
+                <a:latin typeface="Futura Condensed" charset="0"/>
+                <a:ea typeface="Futura Condensed" charset="0"/>
+                <a:cs typeface="Futura Condensed" charset="0"/>
+              </a:rPr>
+              <a:t>Pour chaque sommet on effectue un petit déplacements</a:t>
+            </a:r>
+          </a:p>
+          <a:p>
+            <a:pPr marL="1028700" lvl="1" indent="-571500">
+              <a:buFont typeface="Arial" charset="0"/>
+              <a:buChar char="•"/>
+            </a:pPr>
+            <a:endParaRPr lang="fr-FR" sz="3600" dirty="0" smtClean="0">
+              <a:latin typeface="Futura Condensed" charset="0"/>
+              <a:ea typeface="Futura Condensed" charset="0"/>
+              <a:cs typeface="Futura Condensed" charset="0"/>
+            </a:endParaRPr>
+          </a:p>
+          <a:p>
+            <a:pPr marL="1485900" lvl="2" indent="-571500">
+              <a:buFont typeface="Arial" charset="0"/>
+              <a:buChar char="•"/>
+            </a:pPr>
+            <a:r>
+              <a:rPr lang="fr-FR" sz="3600" i="1" dirty="0" smtClean="0">
+                <a:latin typeface="Futura Condensed" charset="0"/>
+                <a:ea typeface="Futura Condensed" charset="0"/>
+                <a:cs typeface="Futura Condensed" charset="0"/>
+              </a:rPr>
+              <a:t>Pour chaque déplacement on calcule la température moyenne</a:t>
+            </a:r>
+          </a:p>
+          <a:p>
+            <a:pPr marL="1485900" lvl="2" indent="-571500">
+              <a:buFont typeface="Arial" charset="0"/>
+              <a:buChar char="•"/>
+            </a:pPr>
+            <a:r>
+              <a:rPr lang="fr-FR" sz="3600" i="1" dirty="0" smtClean="0">
+                <a:latin typeface="Futura Condensed" charset="0"/>
+                <a:ea typeface="Futura Condensed" charset="0"/>
+                <a:cs typeface="Futura Condensed" charset="0"/>
+              </a:rPr>
+              <a:t> </a:t>
+            </a:r>
+          </a:p>
+          <a:p>
+            <a:pPr marL="1028700" lvl="1" indent="-571500">
+              <a:buFont typeface="Arial" charset="0"/>
+              <a:buChar char="•"/>
+            </a:pPr>
+            <a:r>
+              <a:rPr lang="fr-FR" sz="3600" dirty="0" smtClean="0">
+                <a:latin typeface="Futura Condensed" charset="0"/>
+                <a:ea typeface="Futura Condensed" charset="0"/>
+                <a:cs typeface="Futura Condensed" charset="0"/>
+              </a:rPr>
+              <a:t>On remet le sommet à sa place</a:t>
+            </a:r>
+          </a:p>
+          <a:p>
+            <a:pPr marL="1028700" lvl="1" indent="-571500">
+              <a:buFont typeface="Arial" charset="0"/>
+              <a:buChar char="•"/>
+            </a:pPr>
+            <a:endParaRPr lang="fr-FR" sz="3600" dirty="0" smtClean="0">
+              <a:latin typeface="Futura Condensed" charset="0"/>
+              <a:ea typeface="Futura Condensed" charset="0"/>
+              <a:cs typeface="Futura Condensed" charset="0"/>
+            </a:endParaRPr>
+          </a:p>
+          <a:p>
+            <a:pPr marL="571500" indent="-571500">
+              <a:buFont typeface="Arial" charset="0"/>
+              <a:buChar char="•"/>
+            </a:pPr>
+            <a:r>
+              <a:rPr lang="fr-FR" sz="3600" b="1" dirty="0" smtClean="0">
+                <a:latin typeface="Futura Condensed" charset="0"/>
+                <a:ea typeface="Futura Condensed" charset="0"/>
+                <a:cs typeface="Futura Condensed" charset="0"/>
+              </a:rPr>
+              <a:t>Une fois le parcours des sommets terminé, on retrouve le déplacement avec la meilleur valeur, et on l’effectue</a:t>
+            </a:r>
+            <a:endParaRPr lang="fr-FR" sz="3600" b="1" dirty="0" smtClean="0">
+              <a:latin typeface="Futura Condensed" charset="0"/>
+              <a:ea typeface="Futura Condensed" charset="0"/>
+              <a:cs typeface="Futura Condensed" charset="0"/>
+            </a:endParaRPr>
+          </a:p>
+          <a:p>
+            <a:pPr algn="ctr"/>
+            <a:endParaRPr lang="fr-FR" sz="3200" dirty="0">
+              <a:latin typeface="Futura Condensed" charset="0"/>
+              <a:ea typeface="Futura Condensed" charset="0"/>
+              <a:cs typeface="Futura Condensed" charset="0"/>
+            </a:endParaRPr>
+          </a:p>
+        </p:txBody>
+      </p:sp>
+    </p:spTree>
+    <p:extLst>
+      <p:ext uri="{BB962C8B-B14F-4D97-AF65-F5344CB8AC3E}">
+        <p14:creationId xmlns:p14="http://schemas.microsoft.com/office/powerpoint/2010/main" val="598406900"/>
+      </p:ext>
+    </p:extLst>
+  </p:cSld>
+  <p:clrMapOvr>
+    <a:masterClrMapping/>
+  </p:clrMapOvr>
+</p:sld>
+</file>
+
+<file path=ppt/slides/slide14.xml><?xml version="1.0" encoding="utf-8"?>
+<p:sld xmlns:a="http://schemas.openxmlformats.org/drawingml/2006/main" xmlns:r="http://schemas.openxmlformats.org/officeDocument/2006/relationships" xmlns:p="http://schemas.openxmlformats.org/presentationml/2006/main">
+  <p:cSld>
+    <p:spTree>
+      <p:nvGrpSpPr>
+        <p:cNvPr id="1" name=""/>
+        <p:cNvGrpSpPr/>
+        <p:nvPr/>
+      </p:nvGrpSpPr>
+      <p:grpSpPr>
+        <a:xfrm>
+          <a:off x="0" y="0"/>
+          <a:ext cx="0" cy="0"/>
+          <a:chOff x="0" y="0"/>
+          <a:chExt cx="0" cy="0"/>
+        </a:xfrm>
+      </p:grpSpPr>
+      <p:sp>
+        <p:nvSpPr>
+          <p:cNvPr id="2" name="ZoneTexte 1"/>
+          <p:cNvSpPr txBox="1"/>
+          <p:nvPr/>
+        </p:nvSpPr>
+        <p:spPr>
+          <a:xfrm>
+            <a:off x="0" y="557115"/>
+            <a:ext cx="11057069" cy="1200329"/>
+          </a:xfrm>
+          <a:prstGeom prst="rect">
+            <a:avLst/>
+          </a:prstGeom>
+          <a:noFill/>
+        </p:spPr>
+        <p:txBody>
+          <a:bodyPr wrap="square" rtlCol="0">
+            <a:spAutoFit/>
+          </a:bodyPr>
+          <a:lstStyle/>
+          <a:p>
+            <a:pPr algn="ctr"/>
+            <a:r>
+              <a:rPr lang="fr-FR" sz="4000" b="1" dirty="0" smtClean="0">
+                <a:latin typeface="Futura Condensed" charset="0"/>
+                <a:ea typeface="Futura Condensed" charset="0"/>
+                <a:cs typeface="Futura Condensed" charset="0"/>
+              </a:rPr>
+              <a:t>Résultats : </a:t>
+            </a:r>
+            <a:endParaRPr lang="fr-FR" sz="4000" b="1" dirty="0" smtClean="0">
+              <a:latin typeface="Futura Condensed" charset="0"/>
+              <a:ea typeface="Futura Condensed" charset="0"/>
+              <a:cs typeface="Futura Condensed" charset="0"/>
+            </a:endParaRPr>
+          </a:p>
+          <a:p>
+            <a:pPr algn="ctr"/>
+            <a:endParaRPr lang="fr-FR" sz="3200" dirty="0">
+              <a:latin typeface="Futura Condensed" charset="0"/>
+              <a:ea typeface="Futura Condensed" charset="0"/>
+              <a:cs typeface="Futura Condensed" charset="0"/>
+            </a:endParaRPr>
+          </a:p>
+        </p:txBody>
+      </p:sp>
+      <p:pic>
+        <p:nvPicPr>
+          <p:cNvPr id="3" name="Image 2"/>
+          <p:cNvPicPr>
+            <a:picLocks noChangeAspect="1"/>
+          </p:cNvPicPr>
+          <p:nvPr/>
+        </p:nvPicPr>
+        <p:blipFill>
+          <a:blip r:embed="rId2">
+            <a:extLst>
+              <a:ext uri="{28A0092B-C50C-407E-A947-70E740481C1C}">
+                <a14:useLocalDpi xmlns:a14="http://schemas.microsoft.com/office/drawing/2010/main" val="0"/>
+              </a:ext>
+            </a:extLst>
+          </a:blip>
+          <a:stretch>
+            <a:fillRect/>
+          </a:stretch>
+        </p:blipFill>
+        <p:spPr>
+          <a:xfrm>
+            <a:off x="0" y="1442968"/>
+            <a:ext cx="5852160" cy="4389120"/>
+          </a:xfrm>
+          <a:prstGeom prst="rect">
+            <a:avLst/>
+          </a:prstGeom>
+        </p:spPr>
+      </p:pic>
+      <p:pic>
+        <p:nvPicPr>
+          <p:cNvPr id="4" name="Image 3"/>
+          <p:cNvPicPr>
+            <a:picLocks noChangeAspect="1"/>
+          </p:cNvPicPr>
+          <p:nvPr/>
+        </p:nvPicPr>
+        <p:blipFill>
+          <a:blip r:embed="rId3">
+            <a:extLst>
+              <a:ext uri="{28A0092B-C50C-407E-A947-70E740481C1C}">
+                <a14:useLocalDpi xmlns:a14="http://schemas.microsoft.com/office/drawing/2010/main" val="0"/>
+              </a:ext>
+            </a:extLst>
+          </a:blip>
+          <a:stretch>
+            <a:fillRect/>
+          </a:stretch>
+        </p:blipFill>
+        <p:spPr>
+          <a:xfrm>
+            <a:off x="5852160" y="1442968"/>
+            <a:ext cx="5852160" cy="4389120"/>
+          </a:xfrm>
+          <a:prstGeom prst="rect">
+            <a:avLst/>
+          </a:prstGeom>
+        </p:spPr>
+      </p:pic>
+    </p:spTree>
+    <p:extLst>
+      <p:ext uri="{BB962C8B-B14F-4D97-AF65-F5344CB8AC3E}">
+        <p14:creationId xmlns:p14="http://schemas.microsoft.com/office/powerpoint/2010/main" val="754418551"/>
+      </p:ext>
+    </p:extLst>
+  </p:cSld>
+  <p:clrMapOvr>
+    <a:masterClrMapping/>
+  </p:clrMapOvr>
+</p:sld>
+</file>
+
+<file path=ppt/slides/slide15.xml><?xml version="1.0" encoding="utf-8"?>
+<p:sld xmlns:a="http://schemas.openxmlformats.org/drawingml/2006/main" xmlns:r="http://schemas.openxmlformats.org/officeDocument/2006/relationships" xmlns:p="http://schemas.openxmlformats.org/presentationml/2006/main">
+  <p:cSld>
+    <p:spTree>
+      <p:nvGrpSpPr>
+        <p:cNvPr id="1" name=""/>
+        <p:cNvGrpSpPr/>
+        <p:nvPr/>
+      </p:nvGrpSpPr>
+      <p:grpSpPr>
+        <a:xfrm>
+          <a:off x="0" y="0"/>
+          <a:ext cx="0" cy="0"/>
+          <a:chOff x="0" y="0"/>
+          <a:chExt cx="0" cy="0"/>
+        </a:xfrm>
+      </p:grpSpPr>
+      <p:sp>
+        <p:nvSpPr>
+          <p:cNvPr id="2" name="ZoneTexte 1"/>
+          <p:cNvSpPr txBox="1"/>
+          <p:nvPr/>
+        </p:nvSpPr>
+        <p:spPr>
+          <a:xfrm>
+            <a:off x="504497" y="670954"/>
+            <a:ext cx="11057069" cy="1200329"/>
+          </a:xfrm>
+          <a:prstGeom prst="rect">
+            <a:avLst/>
+          </a:prstGeom>
+          <a:noFill/>
+        </p:spPr>
+        <p:txBody>
+          <a:bodyPr wrap="square" rtlCol="0">
+            <a:spAutoFit/>
+          </a:bodyPr>
+          <a:lstStyle/>
+          <a:p>
+            <a:pPr algn="ctr"/>
+            <a:r>
+              <a:rPr lang="fr-FR" sz="4000" b="1" smtClean="0">
+                <a:latin typeface="Futura Condensed" charset="0"/>
+                <a:ea typeface="Futura Condensed" charset="0"/>
+                <a:cs typeface="Futura Condensed" charset="0"/>
+              </a:rPr>
+              <a:t>Résultats : </a:t>
+            </a:r>
+            <a:endParaRPr lang="fr-FR" sz="4000" b="1" smtClean="0">
+              <a:latin typeface="Futura Condensed" charset="0"/>
+              <a:ea typeface="Futura Condensed" charset="0"/>
+              <a:cs typeface="Futura Condensed" charset="0"/>
+            </a:endParaRPr>
+          </a:p>
+          <a:p>
+            <a:pPr algn="ctr"/>
+            <a:endParaRPr lang="fr-FR" sz="3200" dirty="0">
+              <a:latin typeface="Futura Condensed" charset="0"/>
+              <a:ea typeface="Futura Condensed" charset="0"/>
+              <a:cs typeface="Futura Condensed" charset="0"/>
+            </a:endParaRPr>
+          </a:p>
+        </p:txBody>
+      </p:sp>
+      <p:pic>
+        <p:nvPicPr>
+          <p:cNvPr id="3" name="Image 2"/>
+          <p:cNvPicPr>
+            <a:picLocks noChangeAspect="1"/>
+          </p:cNvPicPr>
+          <p:nvPr/>
+        </p:nvPicPr>
+        <p:blipFill>
+          <a:blip r:embed="rId2">
+            <a:extLst>
+              <a:ext uri="{28A0092B-C50C-407E-A947-70E740481C1C}">
+                <a14:useLocalDpi xmlns:a14="http://schemas.microsoft.com/office/drawing/2010/main" val="0"/>
+              </a:ext>
+            </a:extLst>
+          </a:blip>
+          <a:stretch>
+            <a:fillRect/>
+          </a:stretch>
+        </p:blipFill>
+        <p:spPr>
+          <a:xfrm>
+            <a:off x="8560209" y="2118000"/>
+            <a:ext cx="3489223" cy="2616917"/>
+          </a:xfrm>
+          <a:prstGeom prst="rect">
+            <a:avLst/>
+          </a:prstGeom>
+        </p:spPr>
+      </p:pic>
+      <p:pic>
+        <p:nvPicPr>
+          <p:cNvPr id="4" name="Image 3"/>
+          <p:cNvPicPr>
+            <a:picLocks noChangeAspect="1"/>
+          </p:cNvPicPr>
+          <p:nvPr/>
+        </p:nvPicPr>
+        <p:blipFill>
+          <a:blip r:embed="rId3">
+            <a:extLst>
+              <a:ext uri="{28A0092B-C50C-407E-A947-70E740481C1C}">
+                <a14:useLocalDpi xmlns:a14="http://schemas.microsoft.com/office/drawing/2010/main" val="0"/>
+              </a:ext>
+            </a:extLst>
+          </a:blip>
+          <a:stretch>
+            <a:fillRect/>
+          </a:stretch>
+        </p:blipFill>
+        <p:spPr>
+          <a:xfrm>
+            <a:off x="4435562" y="2118000"/>
+            <a:ext cx="3526024" cy="2606327"/>
+          </a:xfrm>
+          <a:prstGeom prst="rect">
+            <a:avLst/>
+          </a:prstGeom>
+        </p:spPr>
+      </p:pic>
+      <p:sp>
+        <p:nvSpPr>
+          <p:cNvPr id="5" name="ZoneTexte 4"/>
+          <p:cNvSpPr txBox="1"/>
+          <p:nvPr/>
+        </p:nvSpPr>
+        <p:spPr>
+          <a:xfrm>
+            <a:off x="4310294" y="4971044"/>
+            <a:ext cx="3156943" cy="1323439"/>
+          </a:xfrm>
+          <a:prstGeom prst="rect">
+            <a:avLst/>
+          </a:prstGeom>
+          <a:noFill/>
+        </p:spPr>
+        <p:txBody>
+          <a:bodyPr wrap="square" rtlCol="0">
+            <a:spAutoFit/>
+          </a:bodyPr>
+          <a:lstStyle/>
+          <a:p>
+            <a:pPr algn="ctr"/>
+            <a:r>
+              <a:rPr lang="fr-FR" sz="2000" dirty="0" smtClean="0">
+                <a:latin typeface="Futura Condensed" charset="0"/>
+                <a:ea typeface="Futura Condensed" charset="0"/>
+                <a:cs typeface="Futura Condensed" charset="0"/>
+              </a:rPr>
+              <a:t>Pas : 0.25</a:t>
+            </a:r>
+          </a:p>
+          <a:p>
+            <a:pPr algn="ctr"/>
+            <a:endParaRPr lang="fr-FR" sz="2000" dirty="0">
+              <a:latin typeface="Futura Condensed" charset="0"/>
+              <a:ea typeface="Futura Condensed" charset="0"/>
+              <a:cs typeface="Futura Condensed" charset="0"/>
+            </a:endParaRPr>
+          </a:p>
+          <a:p>
+            <a:pPr algn="ctr"/>
+            <a:r>
+              <a:rPr lang="fr-FR" sz="2000" dirty="0">
+                <a:latin typeface="Futura Condensed" charset="0"/>
+                <a:ea typeface="Futura Condensed" charset="0"/>
+                <a:cs typeface="Futura Condensed" charset="0"/>
+              </a:rPr>
+              <a:t>Valeur Moyenne : </a:t>
+            </a:r>
+            <a:r>
+              <a:rPr lang="fr-FR" sz="2000" dirty="0" smtClean="0">
+                <a:latin typeface="Futura Condensed" charset="0"/>
+                <a:ea typeface="Futura Condensed" charset="0"/>
+                <a:cs typeface="Futura Condensed" charset="0"/>
+              </a:rPr>
+              <a:t>1897.1</a:t>
+            </a:r>
+            <a:endParaRPr lang="fr-FR" sz="2000" dirty="0">
+              <a:latin typeface="Futura Condensed" charset="0"/>
+              <a:ea typeface="Futura Condensed" charset="0"/>
+              <a:cs typeface="Futura Condensed" charset="0"/>
+            </a:endParaRPr>
+          </a:p>
+          <a:p>
+            <a:pPr algn="ctr"/>
+            <a:endParaRPr lang="fr-FR" sz="2000" dirty="0">
+              <a:latin typeface="Futura Condensed" charset="0"/>
+              <a:ea typeface="Futura Condensed" charset="0"/>
+              <a:cs typeface="Futura Condensed" charset="0"/>
+            </a:endParaRPr>
+          </a:p>
+        </p:txBody>
+      </p:sp>
+      <p:sp>
+        <p:nvSpPr>
+          <p:cNvPr id="6" name="ZoneTexte 5"/>
+          <p:cNvSpPr txBox="1"/>
+          <p:nvPr/>
+        </p:nvSpPr>
+        <p:spPr>
+          <a:xfrm>
+            <a:off x="8560209" y="4972755"/>
+            <a:ext cx="3156943" cy="1323439"/>
+          </a:xfrm>
+          <a:prstGeom prst="rect">
+            <a:avLst/>
+          </a:prstGeom>
+          <a:noFill/>
+        </p:spPr>
+        <p:txBody>
+          <a:bodyPr wrap="square" rtlCol="0">
+            <a:spAutoFit/>
+          </a:bodyPr>
+          <a:lstStyle/>
+          <a:p>
+            <a:pPr algn="ctr"/>
+            <a:r>
+              <a:rPr lang="fr-FR" sz="2000" dirty="0" smtClean="0">
+                <a:latin typeface="Futura Condensed" charset="0"/>
+                <a:ea typeface="Futura Condensed" charset="0"/>
+                <a:cs typeface="Futura Condensed" charset="0"/>
+              </a:rPr>
+              <a:t>Pas : 0.5</a:t>
+            </a:r>
+          </a:p>
+          <a:p>
+            <a:pPr algn="ctr"/>
+            <a:endParaRPr lang="fr-FR" sz="2000" dirty="0">
+              <a:latin typeface="Futura Condensed" charset="0"/>
+              <a:ea typeface="Futura Condensed" charset="0"/>
+              <a:cs typeface="Futura Condensed" charset="0"/>
+            </a:endParaRPr>
+          </a:p>
+          <a:p>
+            <a:pPr algn="ctr"/>
+            <a:r>
+              <a:rPr lang="fr-FR" sz="2000" dirty="0">
+                <a:latin typeface="Futura Condensed" charset="0"/>
+                <a:ea typeface="Futura Condensed" charset="0"/>
+                <a:cs typeface="Futura Condensed" charset="0"/>
+              </a:rPr>
+              <a:t>Valeur Moyenne : </a:t>
+            </a:r>
+            <a:r>
+              <a:rPr lang="fr-FR" sz="2000" dirty="0" smtClean="0">
+                <a:latin typeface="Futura Condensed" charset="0"/>
+                <a:ea typeface="Futura Condensed" charset="0"/>
+                <a:cs typeface="Futura Condensed" charset="0"/>
+              </a:rPr>
+              <a:t>1898.6</a:t>
+            </a:r>
+            <a:endParaRPr lang="fr-FR" sz="2000" dirty="0">
+              <a:latin typeface="Futura Condensed" charset="0"/>
+              <a:ea typeface="Futura Condensed" charset="0"/>
+              <a:cs typeface="Futura Condensed" charset="0"/>
+            </a:endParaRPr>
+          </a:p>
+          <a:p>
+            <a:pPr algn="ctr"/>
+            <a:endParaRPr lang="fr-FR" sz="2000" dirty="0" smtClean="0">
+              <a:latin typeface="Futura Condensed" charset="0"/>
+              <a:ea typeface="Futura Condensed" charset="0"/>
+              <a:cs typeface="Futura Condensed" charset="0"/>
+            </a:endParaRPr>
+          </a:p>
+        </p:txBody>
+      </p:sp>
+      <p:pic>
+        <p:nvPicPr>
+          <p:cNvPr id="8" name="Image 7"/>
+          <p:cNvPicPr>
+            <a:picLocks noChangeAspect="1"/>
+          </p:cNvPicPr>
+          <p:nvPr/>
+        </p:nvPicPr>
+        <p:blipFill>
+          <a:blip r:embed="rId4">
+            <a:extLst>
+              <a:ext uri="{28A0092B-C50C-407E-A947-70E740481C1C}">
+                <a14:useLocalDpi xmlns:a14="http://schemas.microsoft.com/office/drawing/2010/main" val="0"/>
+              </a:ext>
+            </a:extLst>
+          </a:blip>
+          <a:stretch>
+            <a:fillRect/>
+          </a:stretch>
+        </p:blipFill>
+        <p:spPr>
+          <a:xfrm>
+            <a:off x="484192" y="2109441"/>
+            <a:ext cx="3486515" cy="2614886"/>
+          </a:xfrm>
+          <a:prstGeom prst="rect">
+            <a:avLst/>
+          </a:prstGeom>
+        </p:spPr>
+      </p:pic>
+      <p:sp>
+        <p:nvSpPr>
+          <p:cNvPr id="9" name="ZoneTexte 8"/>
+          <p:cNvSpPr txBox="1"/>
+          <p:nvPr/>
+        </p:nvSpPr>
+        <p:spPr>
+          <a:xfrm>
+            <a:off x="504497" y="4971044"/>
+            <a:ext cx="3156943" cy="1015663"/>
+          </a:xfrm>
+          <a:prstGeom prst="rect">
+            <a:avLst/>
+          </a:prstGeom>
+          <a:noFill/>
+        </p:spPr>
+        <p:txBody>
+          <a:bodyPr wrap="square" rtlCol="0">
+            <a:spAutoFit/>
+          </a:bodyPr>
+          <a:lstStyle/>
+          <a:p>
+            <a:pPr algn="ctr"/>
+            <a:r>
+              <a:rPr lang="fr-FR" sz="2000" dirty="0" smtClean="0">
+                <a:latin typeface="Futura Condensed" charset="0"/>
+                <a:ea typeface="Futura Condensed" charset="0"/>
+                <a:cs typeface="Futura Condensed" charset="0"/>
+              </a:rPr>
+              <a:t>Pas : 0.1</a:t>
+            </a:r>
+          </a:p>
+          <a:p>
+            <a:pPr algn="ctr"/>
+            <a:endParaRPr lang="fr-FR" sz="2000" dirty="0">
+              <a:latin typeface="Futura Condensed" charset="0"/>
+              <a:ea typeface="Futura Condensed" charset="0"/>
+              <a:cs typeface="Futura Condensed" charset="0"/>
+            </a:endParaRPr>
+          </a:p>
+          <a:p>
+            <a:pPr algn="ctr"/>
+            <a:r>
+              <a:rPr lang="fr-FR" sz="2000" dirty="0" smtClean="0">
+                <a:latin typeface="Futura Condensed" charset="0"/>
+                <a:ea typeface="Futura Condensed" charset="0"/>
+                <a:cs typeface="Futura Condensed" charset="0"/>
+              </a:rPr>
+              <a:t>Valeur Moyenne : 1897.8</a:t>
+            </a:r>
+            <a:endParaRPr lang="fr-FR" sz="2000" dirty="0">
+              <a:latin typeface="Futura Condensed" charset="0"/>
+              <a:ea typeface="Futura Condensed" charset="0"/>
+              <a:cs typeface="Futura Condensed" charset="0"/>
+            </a:endParaRPr>
+          </a:p>
+        </p:txBody>
+      </p:sp>
+      <p:sp>
+        <p:nvSpPr>
+          <p:cNvPr id="10" name="ZoneTexte 9"/>
+          <p:cNvSpPr txBox="1"/>
+          <p:nvPr/>
+        </p:nvSpPr>
+        <p:spPr>
+          <a:xfrm>
+            <a:off x="183932" y="1585973"/>
+            <a:ext cx="3156943" cy="400110"/>
+          </a:xfrm>
+          <a:prstGeom prst="rect">
+            <a:avLst/>
+          </a:prstGeom>
+          <a:noFill/>
+        </p:spPr>
+        <p:txBody>
+          <a:bodyPr wrap="square" rtlCol="0">
+            <a:spAutoFit/>
+          </a:bodyPr>
+          <a:lstStyle/>
+          <a:p>
+            <a:pPr algn="ctr"/>
+            <a:r>
+              <a:rPr lang="fr-FR" sz="2000" smtClean="0">
+                <a:latin typeface="Futura Condensed" charset="0"/>
+                <a:ea typeface="Futura Condensed" charset="0"/>
+                <a:cs typeface="Futura Condensed" charset="0"/>
+              </a:rPr>
+              <a:t>Flux rentrant : 10000</a:t>
+            </a:r>
+            <a:endParaRPr lang="fr-FR" sz="2000" dirty="0">
+              <a:latin typeface="Futura Condensed" charset="0"/>
+              <a:ea typeface="Futura Condensed" charset="0"/>
+              <a:cs typeface="Futura Condensed" charset="0"/>
+            </a:endParaRPr>
+          </a:p>
+        </p:txBody>
+      </p:sp>
+    </p:spTree>
+    <p:extLst>
+      <p:ext uri="{BB962C8B-B14F-4D97-AF65-F5344CB8AC3E}">
+        <p14:creationId xmlns:p14="http://schemas.microsoft.com/office/powerpoint/2010/main" val="580920346"/>
+      </p:ext>
+    </p:extLst>
+  </p:cSld>
+  <p:clrMapOvr>
+    <a:masterClrMapping/>
+  </p:clrMapOvr>
+</p:sld>
+</file>
+
+<file path=ppt/slides/slide16.xml><?xml version="1.0" encoding="utf-8"?>
+<p:sld xmlns:a="http://schemas.openxmlformats.org/drawingml/2006/main" xmlns:r="http://schemas.openxmlformats.org/officeDocument/2006/relationships" xmlns:p="http://schemas.openxmlformats.org/presentationml/2006/main">
+  <p:cSld>
+    <p:spTree>
+      <p:nvGrpSpPr>
+        <p:cNvPr id="1" name=""/>
+        <p:cNvGrpSpPr/>
+        <p:nvPr/>
+      </p:nvGrpSpPr>
+      <p:grpSpPr>
+        <a:xfrm>
+          <a:off x="0" y="0"/>
+          <a:ext cx="0" cy="0"/>
+          <a:chOff x="0" y="0"/>
+          <a:chExt cx="0" cy="0"/>
+        </a:xfrm>
+      </p:grpSpPr>
+      <p:sp>
+        <p:nvSpPr>
+          <p:cNvPr id="2" name="ZoneTexte 1"/>
+          <p:cNvSpPr txBox="1"/>
+          <p:nvPr/>
+        </p:nvSpPr>
+        <p:spPr>
+          <a:xfrm>
+            <a:off x="490654" y="824744"/>
+            <a:ext cx="11057069" cy="6740307"/>
+          </a:xfrm>
+          <a:prstGeom prst="rect">
+            <a:avLst/>
+          </a:prstGeom>
+          <a:noFill/>
+        </p:spPr>
+        <p:txBody>
+          <a:bodyPr wrap="square" rtlCol="0">
+            <a:spAutoFit/>
+          </a:bodyPr>
+          <a:lstStyle/>
+          <a:p>
+            <a:pPr algn="ctr"/>
+            <a:r>
+              <a:rPr lang="fr-FR" sz="4000" b="1" dirty="0" smtClean="0">
+                <a:latin typeface="Futura Condensed" charset="0"/>
+                <a:ea typeface="Futura Condensed" charset="0"/>
+                <a:cs typeface="Futura Condensed" charset="0"/>
+              </a:rPr>
+              <a:t>Quelques mots sur le résultat :</a:t>
+            </a:r>
+          </a:p>
+          <a:p>
+            <a:pPr algn="ctr"/>
+            <a:endParaRPr lang="fr-FR" sz="4000" dirty="0">
+              <a:latin typeface="Futura Condensed" charset="0"/>
+              <a:ea typeface="Futura Condensed" charset="0"/>
+              <a:cs typeface="Futura Condensed" charset="0"/>
+            </a:endParaRPr>
+          </a:p>
+          <a:p>
+            <a:pPr marL="571500" indent="-571500">
+              <a:buFont typeface="Arial" charset="0"/>
+              <a:buChar char="•"/>
+            </a:pPr>
+            <a:r>
+              <a:rPr lang="fr-FR" sz="4000" dirty="0" smtClean="0">
+                <a:latin typeface="Futura Condensed" charset="0"/>
+                <a:ea typeface="Futura Condensed" charset="0"/>
+                <a:cs typeface="Futura Condensed" charset="0"/>
+              </a:rPr>
+              <a:t>Les figures semblent devenir symétriques</a:t>
+            </a:r>
+          </a:p>
+          <a:p>
+            <a:pPr marL="571500" indent="-571500">
+              <a:buFont typeface="Arial" charset="0"/>
+              <a:buChar char="•"/>
+            </a:pPr>
+            <a:endParaRPr lang="fr-FR" sz="4000" dirty="0">
+              <a:latin typeface="Futura Condensed" charset="0"/>
+              <a:ea typeface="Futura Condensed" charset="0"/>
+              <a:cs typeface="Futura Condensed" charset="0"/>
+            </a:endParaRPr>
+          </a:p>
+          <a:p>
+            <a:pPr marL="571500" indent="-571500">
+              <a:buFont typeface="Arial" charset="0"/>
+              <a:buChar char="•"/>
+            </a:pPr>
+            <a:r>
+              <a:rPr lang="fr-FR" sz="4000" dirty="0" smtClean="0">
+                <a:latin typeface="Futura Condensed" charset="0"/>
+                <a:ea typeface="Futura Condensed" charset="0"/>
+                <a:cs typeface="Futura Condensed" charset="0"/>
+              </a:rPr>
+              <a:t>Les résultats sont très dépendants de la forme initiale</a:t>
+            </a:r>
+          </a:p>
+          <a:p>
+            <a:pPr marL="571500" indent="-571500">
+              <a:buFont typeface="Arial" charset="0"/>
+              <a:buChar char="•"/>
+            </a:pPr>
+            <a:endParaRPr lang="fr-FR" sz="4000" dirty="0">
+              <a:latin typeface="Futura Condensed" charset="0"/>
+              <a:ea typeface="Futura Condensed" charset="0"/>
+              <a:cs typeface="Futura Condensed" charset="0"/>
+            </a:endParaRPr>
+          </a:p>
+          <a:p>
+            <a:pPr marL="571500" indent="-571500">
+              <a:buFont typeface="Arial" charset="0"/>
+              <a:buChar char="•"/>
+            </a:pPr>
+            <a:r>
+              <a:rPr lang="fr-FR" sz="4000" dirty="0" smtClean="0">
+                <a:latin typeface="Futura Condensed" charset="0"/>
+                <a:ea typeface="Futura Condensed" charset="0"/>
+                <a:cs typeface="Futura Condensed" charset="0"/>
+              </a:rPr>
+              <a:t>La précision du résultat dépend fortement du pas choisi pour les petits déplacements de points</a:t>
+            </a:r>
+            <a:endParaRPr lang="fr-FR" sz="4000" dirty="0" smtClean="0">
+              <a:latin typeface="Futura Condensed" charset="0"/>
+              <a:ea typeface="Futura Condensed" charset="0"/>
+              <a:cs typeface="Futura Condensed" charset="0"/>
+            </a:endParaRPr>
+          </a:p>
+          <a:p>
+            <a:pPr marL="571500" indent="-571500">
+              <a:buFont typeface="Arial" charset="0"/>
+              <a:buChar char="•"/>
+            </a:pPr>
+            <a:endParaRPr lang="fr-FR" sz="4000" dirty="0" smtClean="0">
+              <a:latin typeface="Futura Condensed" charset="0"/>
+              <a:ea typeface="Futura Condensed" charset="0"/>
+              <a:cs typeface="Futura Condensed" charset="0"/>
+            </a:endParaRPr>
+          </a:p>
+          <a:p>
+            <a:pPr marL="571500" indent="-571500">
+              <a:buFont typeface="Arial" charset="0"/>
+              <a:buChar char="•"/>
+            </a:pPr>
+            <a:endParaRPr lang="fr-FR" sz="4000" dirty="0" smtClean="0">
+              <a:latin typeface="Futura Condensed" charset="0"/>
+              <a:ea typeface="Futura Condensed" charset="0"/>
+              <a:cs typeface="Futura Condensed" charset="0"/>
+            </a:endParaRPr>
+          </a:p>
+          <a:p>
+            <a:pPr algn="ctr"/>
+            <a:endParaRPr lang="fr-FR" sz="3200" dirty="0">
+              <a:latin typeface="Futura Condensed" charset="0"/>
+              <a:ea typeface="Futura Condensed" charset="0"/>
+              <a:cs typeface="Futura Condensed" charset="0"/>
+            </a:endParaRPr>
+          </a:p>
+        </p:txBody>
+      </p:sp>
+    </p:spTree>
+    <p:extLst>
+      <p:ext uri="{BB962C8B-B14F-4D97-AF65-F5344CB8AC3E}">
+        <p14:creationId xmlns:p14="http://schemas.microsoft.com/office/powerpoint/2010/main" val="506222361"/>
+      </p:ext>
+    </p:extLst>
+  </p:cSld>
+  <p:clrMapOvr>
+    <a:masterClrMapping/>
+  </p:clrMapOvr>
+</p:sld>
+</file>
+
+<file path=ppt/slides/slide17.xml><?xml version="1.0" encoding="utf-8"?>
+<p:sld xmlns:a="http://schemas.openxmlformats.org/drawingml/2006/main" xmlns:r="http://schemas.openxmlformats.org/officeDocument/2006/relationships" xmlns:p="http://schemas.openxmlformats.org/presentationml/2006/main">
+  <p:cSld>
+    <p:spTree>
+      <p:nvGrpSpPr>
+        <p:cNvPr id="1" name=""/>
+        <p:cNvGrpSpPr/>
+        <p:nvPr/>
+      </p:nvGrpSpPr>
+      <p:grpSpPr>
+        <a:xfrm>
+          <a:off x="0" y="0"/>
+          <a:ext cx="0" cy="0"/>
+          <a:chOff x="0" y="0"/>
+          <a:chExt cx="0" cy="0"/>
+        </a:xfrm>
+      </p:grpSpPr>
+      <p:sp>
+        <p:nvSpPr>
+          <p:cNvPr id="2" name="ZoneTexte 1"/>
+          <p:cNvSpPr txBox="1"/>
+          <p:nvPr/>
+        </p:nvSpPr>
+        <p:spPr>
+          <a:xfrm>
+            <a:off x="490654" y="824744"/>
+            <a:ext cx="11057069" cy="6740307"/>
+          </a:xfrm>
+          <a:prstGeom prst="rect">
+            <a:avLst/>
+          </a:prstGeom>
+          <a:noFill/>
+        </p:spPr>
+        <p:txBody>
+          <a:bodyPr wrap="square" rtlCol="0">
+            <a:spAutoFit/>
+          </a:bodyPr>
+          <a:lstStyle/>
+          <a:p>
+            <a:pPr algn="ctr"/>
+            <a:r>
+              <a:rPr lang="fr-FR" sz="4000" b="1" dirty="0" smtClean="0">
+                <a:latin typeface="Futura Condensed" charset="0"/>
+                <a:ea typeface="Futura Condensed" charset="0"/>
+                <a:cs typeface="Futura Condensed" charset="0"/>
+              </a:rPr>
+              <a:t>Limites de la méthode</a:t>
+            </a:r>
+          </a:p>
+          <a:p>
+            <a:pPr algn="ctr"/>
+            <a:endParaRPr lang="fr-FR" sz="4000" dirty="0">
+              <a:latin typeface="Futura Condensed" charset="0"/>
+              <a:ea typeface="Futura Condensed" charset="0"/>
+              <a:cs typeface="Futura Condensed" charset="0"/>
+            </a:endParaRPr>
+          </a:p>
+          <a:p>
+            <a:pPr marL="571500" indent="-571500">
+              <a:buFont typeface="Arial" charset="0"/>
+              <a:buChar char="•"/>
+            </a:pPr>
+            <a:r>
+              <a:rPr lang="fr-FR" sz="4000" dirty="0" smtClean="0">
+                <a:latin typeface="Futura Condensed" charset="0"/>
+                <a:ea typeface="Futura Condensed" charset="0"/>
+                <a:cs typeface="Futura Condensed" charset="0"/>
+              </a:rPr>
+              <a:t>Pas assez de liberté de mouvements</a:t>
+            </a:r>
+          </a:p>
+          <a:p>
+            <a:pPr marL="571500" indent="-571500">
+              <a:buFont typeface="Arial" charset="0"/>
+              <a:buChar char="•"/>
+            </a:pPr>
+            <a:endParaRPr lang="fr-FR" sz="4000" dirty="0">
+              <a:latin typeface="Futura Condensed" charset="0"/>
+              <a:ea typeface="Futura Condensed" charset="0"/>
+              <a:cs typeface="Futura Condensed" charset="0"/>
+            </a:endParaRPr>
+          </a:p>
+          <a:p>
+            <a:pPr marL="571500" indent="-571500">
+              <a:buFont typeface="Arial" charset="0"/>
+              <a:buChar char="•"/>
+            </a:pPr>
+            <a:r>
+              <a:rPr lang="fr-FR" sz="4000" dirty="0" smtClean="0">
+                <a:latin typeface="Futura Condensed" charset="0"/>
+                <a:ea typeface="Futura Condensed" charset="0"/>
+                <a:cs typeface="Futura Condensed" charset="0"/>
+              </a:rPr>
+              <a:t>Trop dépendant du choix du pas (un pas plus petit ne signifie pas de résultat plus précis)</a:t>
+            </a:r>
+          </a:p>
+          <a:p>
+            <a:pPr marL="571500" indent="-571500">
+              <a:buFont typeface="Arial" charset="0"/>
+              <a:buChar char="•"/>
+            </a:pPr>
+            <a:endParaRPr lang="fr-FR" sz="4000" dirty="0">
+              <a:latin typeface="Futura Condensed" charset="0"/>
+              <a:ea typeface="Futura Condensed" charset="0"/>
+              <a:cs typeface="Futura Condensed" charset="0"/>
+            </a:endParaRPr>
+          </a:p>
+          <a:p>
+            <a:pPr marL="571500" indent="-571500">
+              <a:buFont typeface="Arial" charset="0"/>
+              <a:buChar char="•"/>
+            </a:pPr>
+            <a:r>
+              <a:rPr lang="fr-FR" sz="4000" dirty="0" smtClean="0">
+                <a:latin typeface="Futura Condensed" charset="0"/>
+                <a:ea typeface="Futura Condensed" charset="0"/>
+                <a:cs typeface="Futura Condensed" charset="0"/>
+              </a:rPr>
+              <a:t>L’algorithme ne peut déplacer qu’un seul points à la fois, et n’exploite pas de mouvements symétriques</a:t>
+            </a:r>
+            <a:endParaRPr lang="fr-FR" sz="4000" dirty="0" smtClean="0">
+              <a:latin typeface="Futura Condensed" charset="0"/>
+              <a:ea typeface="Futura Condensed" charset="0"/>
+              <a:cs typeface="Futura Condensed" charset="0"/>
+            </a:endParaRPr>
+          </a:p>
+          <a:p>
+            <a:pPr marL="571500" indent="-571500">
+              <a:buFont typeface="Arial" charset="0"/>
+              <a:buChar char="•"/>
+            </a:pPr>
+            <a:endParaRPr lang="fr-FR" sz="4000" dirty="0" smtClean="0">
+              <a:latin typeface="Futura Condensed" charset="0"/>
+              <a:ea typeface="Futura Condensed" charset="0"/>
+              <a:cs typeface="Futura Condensed" charset="0"/>
+            </a:endParaRPr>
+          </a:p>
+          <a:p>
+            <a:pPr algn="ctr"/>
+            <a:endParaRPr lang="fr-FR" sz="3200" dirty="0">
+              <a:latin typeface="Futura Condensed" charset="0"/>
+              <a:ea typeface="Futura Condensed" charset="0"/>
+              <a:cs typeface="Futura Condensed" charset="0"/>
+            </a:endParaRPr>
+          </a:p>
+        </p:txBody>
+      </p:sp>
+    </p:spTree>
+    <p:extLst>
+      <p:ext uri="{BB962C8B-B14F-4D97-AF65-F5344CB8AC3E}">
+        <p14:creationId xmlns:p14="http://schemas.microsoft.com/office/powerpoint/2010/main" val="1524814812"/>
+      </p:ext>
+    </p:extLst>
+  </p:cSld>
+  <p:clrMapOvr>
+    <a:masterClrMapping/>
+  </p:clrMapOvr>
+</p:sld>
+</file>
+
+<file path=ppt/slides/slide18.xml><?xml version="1.0" encoding="utf-8"?>
+<p:sld xmlns:a="http://schemas.openxmlformats.org/drawingml/2006/main" xmlns:r="http://schemas.openxmlformats.org/officeDocument/2006/relationships" xmlns:p="http://schemas.openxmlformats.org/presentationml/2006/main">
+  <p:cSld>
+    <p:spTree>
+      <p:nvGrpSpPr>
+        <p:cNvPr id="1" name=""/>
+        <p:cNvGrpSpPr/>
+        <p:nvPr/>
+      </p:nvGrpSpPr>
+      <p:grpSpPr>
+        <a:xfrm>
+          <a:off x="0" y="0"/>
+          <a:ext cx="0" cy="0"/>
+          <a:chOff x="0" y="0"/>
+          <a:chExt cx="0" cy="0"/>
+        </a:xfrm>
+      </p:grpSpPr>
+      <p:sp>
+        <p:nvSpPr>
+          <p:cNvPr id="2" name="ZoneTexte 1"/>
+          <p:cNvSpPr txBox="1"/>
+          <p:nvPr/>
+        </p:nvSpPr>
+        <p:spPr>
+          <a:xfrm>
+            <a:off x="-205138" y="225654"/>
+            <a:ext cx="11057069" cy="1815882"/>
+          </a:xfrm>
+          <a:prstGeom prst="rect">
+            <a:avLst/>
+          </a:prstGeom>
+          <a:noFill/>
+        </p:spPr>
+        <p:txBody>
+          <a:bodyPr wrap="square" rtlCol="0">
+            <a:spAutoFit/>
+          </a:bodyPr>
+          <a:lstStyle/>
+          <a:p>
+            <a:pPr marL="571500" indent="-571500">
+              <a:buFont typeface="Arial" charset="0"/>
+              <a:buChar char="•"/>
+            </a:pPr>
+            <a:endParaRPr lang="fr-FR" sz="4000" dirty="0" smtClean="0">
+              <a:latin typeface="Futura Condensed" charset="0"/>
+              <a:ea typeface="Futura Condensed" charset="0"/>
+              <a:cs typeface="Futura Condensed" charset="0"/>
+            </a:endParaRPr>
+          </a:p>
+          <a:p>
+            <a:pPr marL="571500" indent="-571500">
+              <a:buFont typeface="Arial" charset="0"/>
+              <a:buChar char="•"/>
+            </a:pPr>
+            <a:endParaRPr lang="fr-FR" sz="4000" dirty="0" smtClean="0">
+              <a:latin typeface="Futura Condensed" charset="0"/>
+              <a:ea typeface="Futura Condensed" charset="0"/>
+              <a:cs typeface="Futura Condensed" charset="0"/>
+            </a:endParaRPr>
+          </a:p>
+          <a:p>
+            <a:pPr algn="ctr"/>
+            <a:endParaRPr lang="fr-FR" sz="3200" dirty="0">
+              <a:latin typeface="Futura Condensed" charset="0"/>
+              <a:ea typeface="Futura Condensed" charset="0"/>
+              <a:cs typeface="Futura Condensed" charset="0"/>
+            </a:endParaRPr>
+          </a:p>
+        </p:txBody>
+      </p:sp>
+      <p:sp>
+        <p:nvSpPr>
+          <p:cNvPr id="3" name="ZoneTexte 2"/>
+          <p:cNvSpPr txBox="1"/>
+          <p:nvPr/>
+        </p:nvSpPr>
+        <p:spPr>
+          <a:xfrm>
+            <a:off x="774435" y="672026"/>
+            <a:ext cx="9725400" cy="1815882"/>
+          </a:xfrm>
+          <a:prstGeom prst="rect">
+            <a:avLst/>
+          </a:prstGeom>
+          <a:noFill/>
+        </p:spPr>
+        <p:txBody>
+          <a:bodyPr wrap="square" rtlCol="0">
+            <a:spAutoFit/>
+          </a:bodyPr>
+          <a:lstStyle/>
+          <a:p>
+            <a:pPr algn="ctr"/>
+            <a:r>
+              <a:rPr lang="fr-FR" sz="4000" b="1" dirty="0" smtClean="0">
+                <a:latin typeface="Futura Condensed" charset="0"/>
+                <a:ea typeface="Futura Condensed" charset="0"/>
+                <a:cs typeface="Futura Condensed" charset="0"/>
+              </a:rPr>
+              <a:t>Relations qualitatives entre forme de la pièce et température moyenne</a:t>
+            </a:r>
+            <a:endParaRPr lang="fr-FR" sz="4000" dirty="0" smtClean="0">
+              <a:latin typeface="Futura Condensed" charset="0"/>
+              <a:ea typeface="Futura Condensed" charset="0"/>
+              <a:cs typeface="Futura Condensed" charset="0"/>
+            </a:endParaRPr>
+          </a:p>
+          <a:p>
+            <a:pPr algn="ctr"/>
+            <a:endParaRPr lang="fr-FR" sz="3200" dirty="0">
+              <a:latin typeface="Futura Condensed" charset="0"/>
+              <a:ea typeface="Futura Condensed" charset="0"/>
+              <a:cs typeface="Futura Condensed" charset="0"/>
+            </a:endParaRPr>
+          </a:p>
+        </p:txBody>
+      </p:sp>
+      <p:sp>
+        <p:nvSpPr>
+          <p:cNvPr id="9" name="ZoneTexte 8"/>
+          <p:cNvSpPr txBox="1"/>
+          <p:nvPr/>
+        </p:nvSpPr>
+        <p:spPr>
+          <a:xfrm>
+            <a:off x="7946242" y="2041536"/>
+            <a:ext cx="2905689" cy="8094524"/>
+          </a:xfrm>
+          <a:prstGeom prst="rect">
+            <a:avLst/>
+          </a:prstGeom>
+          <a:noFill/>
+        </p:spPr>
+        <p:txBody>
+          <a:bodyPr wrap="square" rtlCol="0">
+            <a:spAutoFit/>
+          </a:bodyPr>
+          <a:lstStyle/>
+          <a:p>
+            <a:pPr algn="ctr"/>
+            <a:r>
+              <a:rPr lang="fr-FR" sz="2800" dirty="0" smtClean="0">
+                <a:latin typeface="Futura Condensed" charset="0"/>
+                <a:ea typeface="Futura Condensed" charset="0"/>
+                <a:cs typeface="Futura Condensed" charset="0"/>
+              </a:rPr>
+              <a:t>Valeurs moyennes de la température :</a:t>
+            </a:r>
+          </a:p>
+          <a:p>
+            <a:pPr algn="ctr"/>
+            <a:endParaRPr lang="fr-FR" sz="2800" dirty="0">
+              <a:latin typeface="Futura Condensed" charset="0"/>
+              <a:ea typeface="Futura Condensed" charset="0"/>
+              <a:cs typeface="Futura Condensed" charset="0"/>
+            </a:endParaRPr>
+          </a:p>
+          <a:p>
+            <a:r>
+              <a:rPr lang="fr-FR" sz="2800" dirty="0" smtClean="0">
+                <a:latin typeface="Futura Condensed" charset="0"/>
+                <a:ea typeface="Futura Condensed" charset="0"/>
+                <a:cs typeface="Futura Condensed" charset="0"/>
+              </a:rPr>
+              <a:t>Verte : 1279</a:t>
+            </a:r>
+          </a:p>
+          <a:p>
+            <a:endParaRPr lang="fr-FR" sz="2800" dirty="0">
+              <a:latin typeface="Futura Condensed" charset="0"/>
+              <a:ea typeface="Futura Condensed" charset="0"/>
+              <a:cs typeface="Futura Condensed" charset="0"/>
+            </a:endParaRPr>
+          </a:p>
+          <a:p>
+            <a:r>
+              <a:rPr lang="fr-FR" sz="2800" dirty="0" smtClean="0">
+                <a:latin typeface="Futura Condensed" charset="0"/>
+                <a:ea typeface="Futura Condensed" charset="0"/>
+                <a:cs typeface="Futura Condensed" charset="0"/>
+              </a:rPr>
+              <a:t>Bleue : 1370</a:t>
+            </a:r>
+          </a:p>
+          <a:p>
+            <a:endParaRPr lang="fr-FR" sz="2800" dirty="0">
+              <a:latin typeface="Futura Condensed" charset="0"/>
+              <a:ea typeface="Futura Condensed" charset="0"/>
+              <a:cs typeface="Futura Condensed" charset="0"/>
+            </a:endParaRPr>
+          </a:p>
+          <a:p>
+            <a:r>
+              <a:rPr lang="fr-FR" sz="2800" dirty="0" smtClean="0">
+                <a:latin typeface="Futura Condensed" charset="0"/>
+                <a:ea typeface="Futura Condensed" charset="0"/>
+                <a:cs typeface="Futura Condensed" charset="0"/>
+              </a:rPr>
+              <a:t>Rouge : 1020</a:t>
+            </a:r>
+          </a:p>
+          <a:p>
+            <a:endParaRPr lang="fr-FR" sz="2800" dirty="0">
+              <a:latin typeface="Futura Condensed" charset="0"/>
+              <a:ea typeface="Futura Condensed" charset="0"/>
+              <a:cs typeface="Futura Condensed" charset="0"/>
+            </a:endParaRPr>
+          </a:p>
+          <a:p>
+            <a:r>
+              <a:rPr lang="fr-FR" sz="2800" dirty="0" smtClean="0">
+                <a:latin typeface="Futura Condensed" charset="0"/>
+                <a:ea typeface="Futura Condensed" charset="0"/>
+                <a:cs typeface="Futura Condensed" charset="0"/>
+              </a:rPr>
+              <a:t>Cyan :  1455</a:t>
+            </a:r>
+          </a:p>
+          <a:p>
+            <a:endParaRPr lang="fr-FR" sz="2800" dirty="0">
+              <a:latin typeface="Futura Condensed" charset="0"/>
+              <a:ea typeface="Futura Condensed" charset="0"/>
+              <a:cs typeface="Futura Condensed" charset="0"/>
+            </a:endParaRPr>
+          </a:p>
+          <a:p>
+            <a:endParaRPr lang="fr-FR" sz="2800" dirty="0" smtClean="0">
+              <a:latin typeface="Futura Condensed" charset="0"/>
+              <a:ea typeface="Futura Condensed" charset="0"/>
+              <a:cs typeface="Futura Condensed" charset="0"/>
+            </a:endParaRPr>
+          </a:p>
+          <a:p>
+            <a:endParaRPr lang="fr-FR" sz="2800" dirty="0">
+              <a:latin typeface="Futura Condensed" charset="0"/>
+              <a:ea typeface="Futura Condensed" charset="0"/>
+              <a:cs typeface="Futura Condensed" charset="0"/>
+            </a:endParaRPr>
+          </a:p>
+          <a:p>
+            <a:endParaRPr lang="fr-FR" sz="2800" dirty="0" smtClean="0">
+              <a:latin typeface="Futura Condensed" charset="0"/>
+              <a:ea typeface="Futura Condensed" charset="0"/>
+              <a:cs typeface="Futura Condensed" charset="0"/>
+            </a:endParaRPr>
+          </a:p>
+          <a:p>
+            <a:endParaRPr lang="fr-FR" sz="2800" dirty="0">
+              <a:latin typeface="Futura Condensed" charset="0"/>
+              <a:ea typeface="Futura Condensed" charset="0"/>
+              <a:cs typeface="Futura Condensed" charset="0"/>
+            </a:endParaRPr>
+          </a:p>
+          <a:p>
+            <a:endParaRPr lang="fr-FR" sz="2800" dirty="0" smtClean="0">
+              <a:latin typeface="Futura Condensed" charset="0"/>
+              <a:ea typeface="Futura Condensed" charset="0"/>
+              <a:cs typeface="Futura Condensed" charset="0"/>
+            </a:endParaRPr>
+          </a:p>
+          <a:p>
+            <a:pPr marL="571500" indent="-571500">
+              <a:buFont typeface="Arial" charset="0"/>
+              <a:buChar char="•"/>
+            </a:pPr>
+            <a:endParaRPr lang="fr-FR" sz="4000" dirty="0" smtClean="0">
+              <a:latin typeface="Futura Condensed" charset="0"/>
+              <a:ea typeface="Futura Condensed" charset="0"/>
+              <a:cs typeface="Futura Condensed" charset="0"/>
+            </a:endParaRPr>
+          </a:p>
+          <a:p>
+            <a:pPr algn="ctr"/>
+            <a:endParaRPr lang="fr-FR" sz="3200" dirty="0">
+              <a:latin typeface="Futura Condensed" charset="0"/>
+              <a:ea typeface="Futura Condensed" charset="0"/>
+              <a:cs typeface="Futura Condensed" charset="0"/>
+            </a:endParaRPr>
+          </a:p>
+        </p:txBody>
+      </p:sp>
+      <p:pic>
+        <p:nvPicPr>
+          <p:cNvPr id="10" name="Image 9"/>
+          <p:cNvPicPr>
+            <a:picLocks noChangeAspect="1"/>
+          </p:cNvPicPr>
+          <p:nvPr/>
+        </p:nvPicPr>
+        <p:blipFill>
+          <a:blip r:embed="rId2">
+            <a:extLst>
+              <a:ext uri="{28A0092B-C50C-407E-A947-70E740481C1C}">
+                <a14:useLocalDpi xmlns:a14="http://schemas.microsoft.com/office/drawing/2010/main" val="0"/>
+              </a:ext>
+            </a:extLst>
+          </a:blip>
+          <a:stretch>
+            <a:fillRect/>
+          </a:stretch>
+        </p:blipFill>
+        <p:spPr>
+          <a:xfrm>
+            <a:off x="1101271" y="2041536"/>
+            <a:ext cx="5852160" cy="4389120"/>
+          </a:xfrm>
+          <a:prstGeom prst="rect">
+            <a:avLst/>
+          </a:prstGeom>
+        </p:spPr>
+      </p:pic>
+    </p:spTree>
+    <p:extLst>
+      <p:ext uri="{BB962C8B-B14F-4D97-AF65-F5344CB8AC3E}">
+        <p14:creationId xmlns:p14="http://schemas.microsoft.com/office/powerpoint/2010/main" val="1307431881"/>
+      </p:ext>
+    </p:extLst>
+  </p:cSld>
+  <p:clrMapOvr>
+    <a:masterClrMapping/>
+  </p:clrMapOvr>
+</p:sld>
+</file>
+
+<file path=ppt/slides/slide19.xml><?xml version="1.0" encoding="utf-8"?>
+<p:sld xmlns:a="http://schemas.openxmlformats.org/drawingml/2006/main" xmlns:r="http://schemas.openxmlformats.org/officeDocument/2006/relationships" xmlns:p="http://schemas.openxmlformats.org/presentationml/2006/main">
+  <p:cSld>
+    <p:spTree>
+      <p:nvGrpSpPr>
+        <p:cNvPr id="1" name=""/>
+        <p:cNvGrpSpPr/>
+        <p:nvPr/>
+      </p:nvGrpSpPr>
+      <p:grpSpPr>
+        <a:xfrm>
+          <a:off x="0" y="0"/>
+          <a:ext cx="0" cy="0"/>
+          <a:chOff x="0" y="0"/>
+          <a:chExt cx="0" cy="0"/>
+        </a:xfrm>
+      </p:grpSpPr>
+      <p:sp>
+        <p:nvSpPr>
+          <p:cNvPr id="2" name="ZoneTexte 1"/>
+          <p:cNvSpPr txBox="1"/>
+          <p:nvPr/>
+        </p:nvSpPr>
+        <p:spPr>
+          <a:xfrm>
+            <a:off x="774435" y="672026"/>
+            <a:ext cx="9725400" cy="1815882"/>
+          </a:xfrm>
+          <a:prstGeom prst="rect">
+            <a:avLst/>
+          </a:prstGeom>
+          <a:noFill/>
+        </p:spPr>
+        <p:txBody>
+          <a:bodyPr wrap="square" rtlCol="0">
+            <a:spAutoFit/>
+          </a:bodyPr>
+          <a:lstStyle/>
+          <a:p>
+            <a:pPr algn="ctr"/>
+            <a:r>
+              <a:rPr lang="fr-FR" sz="4000" b="1" dirty="0" smtClean="0">
+                <a:latin typeface="Futura Condensed" charset="0"/>
+                <a:ea typeface="Futura Condensed" charset="0"/>
+                <a:cs typeface="Futura Condensed" charset="0"/>
+              </a:rPr>
+              <a:t>Relations qualitatives entre forme de la pièce et température moyenne</a:t>
+            </a:r>
+            <a:endParaRPr lang="fr-FR" sz="4000" dirty="0" smtClean="0">
+              <a:latin typeface="Futura Condensed" charset="0"/>
+              <a:ea typeface="Futura Condensed" charset="0"/>
+              <a:cs typeface="Futura Condensed" charset="0"/>
+            </a:endParaRPr>
+          </a:p>
+          <a:p>
+            <a:pPr algn="ctr"/>
+            <a:endParaRPr lang="fr-FR" sz="3200" dirty="0">
+              <a:latin typeface="Futura Condensed" charset="0"/>
+              <a:ea typeface="Futura Condensed" charset="0"/>
+              <a:cs typeface="Futura Condensed" charset="0"/>
+            </a:endParaRPr>
+          </a:p>
+        </p:txBody>
+      </p:sp>
+    </p:spTree>
+    <p:extLst>
+      <p:ext uri="{BB962C8B-B14F-4D97-AF65-F5344CB8AC3E}">
+        <p14:creationId xmlns:p14="http://schemas.microsoft.com/office/powerpoint/2010/main" val="193630791"/>
       </p:ext>
     </p:extLst>
   </p:cSld>
@@ -4577,8 +6581,8 @@
         </p:blipFill>
         <p:spPr>
           <a:xfrm>
-            <a:off x="740541" y="4226559"/>
-            <a:ext cx="10598019" cy="1418861"/>
+            <a:off x="1971040" y="4094107"/>
+            <a:ext cx="9144000" cy="1279534"/>
           </a:xfrm>
           <a:prstGeom prst="rect">
             <a:avLst/>
@@ -4975,7 +6979,7 @@
         </p:nvSpPr>
         <p:spPr>
           <a:xfrm>
-            <a:off x="1840902" y="2273080"/>
+            <a:off x="1840900" y="2382170"/>
             <a:ext cx="1896035" cy="1559859"/>
           </a:xfrm>
           <a:prstGeom prst="downArrow">
@@ -5015,7 +7019,7 @@
         </p:nvSpPr>
         <p:spPr>
           <a:xfrm>
-            <a:off x="174812" y="4088964"/>
+            <a:off x="174810" y="4319384"/>
             <a:ext cx="5228217" cy="1815882"/>
           </a:xfrm>
           <a:prstGeom prst="rect">
@@ -5071,8 +7075,8 @@
         </p:blipFill>
         <p:spPr>
           <a:xfrm>
-            <a:off x="5999630" y="878696"/>
-            <a:ext cx="4760504" cy="4348629"/>
+            <a:off x="6155747" y="1449660"/>
+            <a:ext cx="5062380" cy="4666684"/>
           </a:xfrm>
           <a:prstGeom prst="rect">
             <a:avLst/>
@@ -5211,8 +7215,8 @@
           <a:chExt cx="0" cy="0"/>
         </a:xfrm>
       </p:grpSpPr>
-      <mc:AlternateContent xmlns:mc="http://schemas.openxmlformats.org/markup-compatibility/2006">
-        <mc:Choice xmlns:a14="http://schemas.microsoft.com/office/drawing/2010/main" Requires="a14">
+      <mc:AlternateContent xmlns:mc="http://schemas.openxmlformats.org/markup-compatibility/2006" xmlns:a14="http://schemas.microsoft.com/office/drawing/2010/main">
+        <mc:Choice Requires="a14">
           <p:sp>
             <p:nvSpPr>
               <p:cNvPr id="2" name="ZoneTexte 1"/>
@@ -5291,7 +7295,7 @@
             </p:txBody>
           </p:sp>
         </mc:Choice>
-        <mc:Fallback>
+        <mc:Fallback xmlns="">
           <p:sp>
             <p:nvSpPr>
               <p:cNvPr id="2" name="ZoneTexte 1"/>

</xml_diff>